<commit_message>
Added Titles to Presentation
</commit_message>
<xml_diff>
--- a/IrisPresentation.pptx
+++ b/IrisPresentation.pptx
@@ -262,7 +262,7 @@
           <a:p>
             <a:fld id="{9D122DCD-549A-4F25-BB97-437A8A1755C2}" type="datetimeFigureOut">
               <a:rPr lang="en-US" smtClean="0"/>
-              <a:t>3/2/2018</a:t>
+              <a:t>3/3/2018</a:t>
             </a:fld>
             <a:endParaRPr lang="en-US"/>
           </a:p>
@@ -460,7 +460,7 @@
           <a:p>
             <a:fld id="{9D122DCD-549A-4F25-BB97-437A8A1755C2}" type="datetimeFigureOut">
               <a:rPr lang="en-US" smtClean="0"/>
-              <a:t>3/2/2018</a:t>
+              <a:t>3/3/2018</a:t>
             </a:fld>
             <a:endParaRPr lang="en-US"/>
           </a:p>
@@ -668,7 +668,7 @@
           <a:p>
             <a:fld id="{9D122DCD-549A-4F25-BB97-437A8A1755C2}" type="datetimeFigureOut">
               <a:rPr lang="en-US" smtClean="0"/>
-              <a:t>3/2/2018</a:t>
+              <a:t>3/3/2018</a:t>
             </a:fld>
             <a:endParaRPr lang="en-US"/>
           </a:p>
@@ -866,7 +866,7 @@
           <a:p>
             <a:fld id="{9D122DCD-549A-4F25-BB97-437A8A1755C2}" type="datetimeFigureOut">
               <a:rPr lang="en-US" smtClean="0"/>
-              <a:t>3/2/2018</a:t>
+              <a:t>3/3/2018</a:t>
             </a:fld>
             <a:endParaRPr lang="en-US"/>
           </a:p>
@@ -1141,7 +1141,7 @@
           <a:p>
             <a:fld id="{9D122DCD-549A-4F25-BB97-437A8A1755C2}" type="datetimeFigureOut">
               <a:rPr lang="en-US" smtClean="0"/>
-              <a:t>3/2/2018</a:t>
+              <a:t>3/3/2018</a:t>
             </a:fld>
             <a:endParaRPr lang="en-US"/>
           </a:p>
@@ -1406,7 +1406,7 @@
           <a:p>
             <a:fld id="{9D122DCD-549A-4F25-BB97-437A8A1755C2}" type="datetimeFigureOut">
               <a:rPr lang="en-US" smtClean="0"/>
-              <a:t>3/2/2018</a:t>
+              <a:t>3/3/2018</a:t>
             </a:fld>
             <a:endParaRPr lang="en-US"/>
           </a:p>
@@ -1818,7 +1818,7 @@
           <a:p>
             <a:fld id="{9D122DCD-549A-4F25-BB97-437A8A1755C2}" type="datetimeFigureOut">
               <a:rPr lang="en-US" smtClean="0"/>
-              <a:t>3/2/2018</a:t>
+              <a:t>3/3/2018</a:t>
             </a:fld>
             <a:endParaRPr lang="en-US"/>
           </a:p>
@@ -1959,7 +1959,7 @@
           <a:p>
             <a:fld id="{9D122DCD-549A-4F25-BB97-437A8A1755C2}" type="datetimeFigureOut">
               <a:rPr lang="en-US" smtClean="0"/>
-              <a:t>3/2/2018</a:t>
+              <a:t>3/3/2018</a:t>
             </a:fld>
             <a:endParaRPr lang="en-US"/>
           </a:p>
@@ -2072,7 +2072,7 @@
           <a:p>
             <a:fld id="{9D122DCD-549A-4F25-BB97-437A8A1755C2}" type="datetimeFigureOut">
               <a:rPr lang="en-US" smtClean="0"/>
-              <a:t>3/2/2018</a:t>
+              <a:t>3/3/2018</a:t>
             </a:fld>
             <a:endParaRPr lang="en-US"/>
           </a:p>
@@ -2383,7 +2383,7 @@
           <a:p>
             <a:fld id="{9D122DCD-549A-4F25-BB97-437A8A1755C2}" type="datetimeFigureOut">
               <a:rPr lang="en-US" smtClean="0"/>
-              <a:t>3/2/2018</a:t>
+              <a:t>3/3/2018</a:t>
             </a:fld>
             <a:endParaRPr lang="en-US"/>
           </a:p>
@@ -2671,7 +2671,7 @@
           <a:p>
             <a:fld id="{9D122DCD-549A-4F25-BB97-437A8A1755C2}" type="datetimeFigureOut">
               <a:rPr lang="en-US" smtClean="0"/>
-              <a:t>3/2/2018</a:t>
+              <a:t>3/3/2018</a:t>
             </a:fld>
             <a:endParaRPr lang="en-US"/>
           </a:p>
@@ -2912,7 +2912,7 @@
           <a:p>
             <a:fld id="{9D122DCD-549A-4F25-BB97-437A8A1755C2}" type="datetimeFigureOut">
               <a:rPr lang="en-US" smtClean="0"/>
-              <a:t>3/2/2018</a:t>
+              <a:t>3/3/2018</a:t>
             </a:fld>
             <a:endParaRPr lang="en-US"/>
           </a:p>
@@ -3757,14 +3757,11 @@
           <a:lstStyle/>
           <a:p>
             <a:r>
-              <a:rPr lang="en-US">
+              <a:rPr lang="en-US" dirty="0">
                 <a:latin typeface="Bahnschrift" panose="020B0502040204020203" pitchFamily="34" charset="0"/>
               </a:rPr>
-              <a:t>  Iris                                                                       Background &amp; Data</a:t>
-            </a:r>
-            <a:endParaRPr lang="en-US" dirty="0">
-              <a:latin typeface="Bahnschrift" panose="020B0502040204020203" pitchFamily="34" charset="0"/>
-            </a:endParaRPr>
+              <a:t>  Iris                                              Data Exploration</a:t>
+            </a:r>
           </a:p>
         </p:txBody>
       </p:sp>
@@ -3861,15 +3858,7 @@
             </a:r>
             <a:r>
               <a:rPr lang="en-US" sz="1500" dirty="0"/>
-              <a:t>, </a:t>
-            </a:r>
-            <a:r>
-              <a:rPr lang="en-US" sz="1500" dirty="0" err="1"/>
-              <a:t>Vericolor</a:t>
-            </a:r>
-            <a:r>
-              <a:rPr lang="en-US" sz="1500" dirty="0"/>
-              <a:t>, Virginica) fifty (50) instances each</a:t>
+              <a:t>, Versicolor, Virginica) fifty (50) instances each</a:t>
             </a:r>
           </a:p>
           <a:p>
@@ -4546,7 +4535,7 @@
         </p:blipFill>
         <p:spPr>
           <a:xfrm>
-            <a:off x="4165677" y="901269"/>
+            <a:off x="4125225" y="1011009"/>
             <a:ext cx="2783652" cy="1667624"/>
           </a:xfrm>
           <a:prstGeom prst="rect">
@@ -4618,8 +4607,8 @@
         </p:blipFill>
         <p:spPr bwMode="auto">
           <a:xfrm>
-            <a:off x="798460" y="1371545"/>
-            <a:ext cx="3044697" cy="1824011"/>
+            <a:off x="704676" y="1315361"/>
+            <a:ext cx="3138482" cy="1880196"/>
           </a:xfrm>
           <a:prstGeom prst="rect">
             <a:avLst/>
@@ -4664,7 +4653,15 @@
           </a:bodyPr>
           <a:lstStyle/>
           <a:p>
-            <a:endParaRPr lang="en-US" sz="1800" dirty="0"/>
+            <a:pPr marL="0" indent="0" algn="ctr">
+              <a:buNone/>
+            </a:pPr>
+            <a:r>
+              <a:rPr lang="en-US" sz="1800" dirty="0">
+                <a:latin typeface="Bahnschrift" panose="020B0502040204020203" pitchFamily="34" charset="0"/>
+              </a:rPr>
+              <a:t>Boxplot of Iris attributes</a:t>
+            </a:r>
           </a:p>
         </p:txBody>
       </p:sp>
@@ -4731,16 +4728,17 @@
           </a:bodyPr>
           <a:lstStyle/>
           <a:p>
-            <a:r>
-              <a:rPr lang="en-US" sz="3400"/>
+            <a:pPr algn="ctr"/>
+            <a:r>
+              <a:rPr lang="en-US" sz="3400" dirty="0"/>
               <a:t>    </a:t>
             </a:r>
             <a:br>
-              <a:rPr lang="en-US" sz="3400"/>
+              <a:rPr lang="en-US" sz="3400" dirty="0"/>
             </a:br>
             <a:r>
-              <a:rPr lang="en-US" sz="3400"/>
-              <a:t>Visualization and Analysis of Iris Data</a:t>
+              <a:rPr lang="en-US" sz="3400" b="1" dirty="0"/>
+              <a:t>Visualization of Iris Data</a:t>
             </a:r>
           </a:p>
         </p:txBody>
@@ -4773,14 +4771,174 @@
         </p:blipFill>
         <p:spPr>
           <a:xfrm>
-            <a:off x="699703" y="4188196"/>
-            <a:ext cx="2908810" cy="2019790"/>
+            <a:off x="923110" y="4266948"/>
+            <a:ext cx="2795395" cy="1941038"/>
           </a:xfrm>
           <a:prstGeom prst="rect">
             <a:avLst/>
           </a:prstGeom>
         </p:spPr>
       </p:pic>
+      <p:sp>
+        <p:nvSpPr>
+          <p:cNvPr id="3" name="TextBox 2">
+            <a:extLst>
+              <a:ext uri="{FF2B5EF4-FFF2-40B4-BE49-F238E27FC236}">
+                <a16:creationId xmlns:a16="http://schemas.microsoft.com/office/drawing/2014/main" id="{44E69696-5246-417F-9820-439182240044}"/>
+              </a:ext>
+            </a:extLst>
+          </p:cNvPr>
+          <p:cNvSpPr txBox="1"/>
+          <p:nvPr/>
+        </p:nvSpPr>
+        <p:spPr>
+          <a:xfrm>
+            <a:off x="1438712" y="834705"/>
+            <a:ext cx="2114026" cy="338554"/>
+          </a:xfrm>
+          <a:prstGeom prst="rect">
+            <a:avLst/>
+          </a:prstGeom>
+          <a:noFill/>
+        </p:spPr>
+        <p:txBody>
+          <a:bodyPr wrap="square" rtlCol="0">
+            <a:spAutoFit/>
+          </a:bodyPr>
+          <a:lstStyle/>
+          <a:p>
+            <a:r>
+              <a:rPr lang="en-US" sz="1600" dirty="0">
+                <a:solidFill>
+                  <a:schemeClr val="bg1"/>
+                </a:solidFill>
+                <a:latin typeface="Bahnschrift" panose="020B0502040204020203" pitchFamily="34" charset="0"/>
+              </a:rPr>
+              <a:t>Average Petal Width</a:t>
+            </a:r>
+          </a:p>
+        </p:txBody>
+      </p:sp>
+      <p:sp>
+        <p:nvSpPr>
+          <p:cNvPr id="16" name="TextBox 15">
+            <a:extLst>
+              <a:ext uri="{FF2B5EF4-FFF2-40B4-BE49-F238E27FC236}">
+                <a16:creationId xmlns:a16="http://schemas.microsoft.com/office/drawing/2014/main" id="{0DE49327-287B-4A33-915C-475683A7864F}"/>
+              </a:ext>
+            </a:extLst>
+          </p:cNvPr>
+          <p:cNvSpPr txBox="1"/>
+          <p:nvPr/>
+        </p:nvSpPr>
+        <p:spPr>
+          <a:xfrm>
+            <a:off x="4541084" y="665428"/>
+            <a:ext cx="2114026" cy="338554"/>
+          </a:xfrm>
+          <a:prstGeom prst="rect">
+            <a:avLst/>
+          </a:prstGeom>
+          <a:noFill/>
+        </p:spPr>
+        <p:txBody>
+          <a:bodyPr wrap="square" rtlCol="0">
+            <a:spAutoFit/>
+          </a:bodyPr>
+          <a:lstStyle/>
+          <a:p>
+            <a:r>
+              <a:rPr lang="en-US" sz="1600" dirty="0">
+                <a:solidFill>
+                  <a:schemeClr val="bg1"/>
+                </a:solidFill>
+                <a:latin typeface="Bahnschrift" panose="020B0502040204020203" pitchFamily="34" charset="0"/>
+              </a:rPr>
+              <a:t>Average Petal Length</a:t>
+            </a:r>
+          </a:p>
+        </p:txBody>
+      </p:sp>
+      <p:sp>
+        <p:nvSpPr>
+          <p:cNvPr id="17" name="TextBox 16">
+            <a:extLst>
+              <a:ext uri="{FF2B5EF4-FFF2-40B4-BE49-F238E27FC236}">
+                <a16:creationId xmlns:a16="http://schemas.microsoft.com/office/drawing/2014/main" id="{9E17DA9E-D403-4E3E-B213-F8313FF66D59}"/>
+              </a:ext>
+            </a:extLst>
+          </p:cNvPr>
+          <p:cNvSpPr txBox="1"/>
+          <p:nvPr/>
+        </p:nvSpPr>
+        <p:spPr>
+          <a:xfrm>
+            <a:off x="4460038" y="3037251"/>
+            <a:ext cx="2114026" cy="338554"/>
+          </a:xfrm>
+          <a:prstGeom prst="rect">
+            <a:avLst/>
+          </a:prstGeom>
+          <a:noFill/>
+        </p:spPr>
+        <p:txBody>
+          <a:bodyPr wrap="square" rtlCol="0">
+            <a:spAutoFit/>
+          </a:bodyPr>
+          <a:lstStyle/>
+          <a:p>
+            <a:r>
+              <a:rPr lang="en-US" sz="1600" dirty="0">
+                <a:solidFill>
+                  <a:schemeClr val="bg1"/>
+                </a:solidFill>
+                <a:latin typeface="Bahnschrift" panose="020B0502040204020203" pitchFamily="34" charset="0"/>
+              </a:rPr>
+              <a:t>Average Sepal Width</a:t>
+            </a:r>
+          </a:p>
+        </p:txBody>
+      </p:sp>
+      <p:sp>
+        <p:nvSpPr>
+          <p:cNvPr id="18" name="TextBox 17">
+            <a:extLst>
+              <a:ext uri="{FF2B5EF4-FFF2-40B4-BE49-F238E27FC236}">
+                <a16:creationId xmlns:a16="http://schemas.microsoft.com/office/drawing/2014/main" id="{8B4F0D27-B5E6-40B8-AE4C-63952D02504F}"/>
+              </a:ext>
+            </a:extLst>
+          </p:cNvPr>
+          <p:cNvSpPr txBox="1"/>
+          <p:nvPr/>
+        </p:nvSpPr>
+        <p:spPr>
+          <a:xfrm>
+            <a:off x="1332342" y="4051357"/>
+            <a:ext cx="2287508" cy="338554"/>
+          </a:xfrm>
+          <a:prstGeom prst="rect">
+            <a:avLst/>
+          </a:prstGeom>
+          <a:noFill/>
+        </p:spPr>
+        <p:txBody>
+          <a:bodyPr wrap="square" rtlCol="0">
+            <a:spAutoFit/>
+          </a:bodyPr>
+          <a:lstStyle/>
+          <a:p>
+            <a:r>
+              <a:rPr lang="en-US" sz="1600" dirty="0">
+                <a:solidFill>
+                  <a:schemeClr val="bg1"/>
+                </a:solidFill>
+                <a:latin typeface="Bahnschrift" panose="020B0502040204020203" pitchFamily="34" charset="0"/>
+              </a:rPr>
+              <a:t>Average Sepal Length</a:t>
+            </a:r>
+          </a:p>
+        </p:txBody>
+      </p:sp>
     </p:spTree>
     <p:extLst>
       <p:ext uri="{BB962C8B-B14F-4D97-AF65-F5344CB8AC3E}">
@@ -5525,7 +5683,7 @@
             </a:pPr>
             <a:r>
               <a:rPr lang="en-US" sz="1800" dirty="0"/>
-              <a:t>Iris-Virginica has the largest petals and the longest sepals of average length of 6.5cm</a:t>
+              <a:t>Iris-Virginica has the largest petal dimensions and the longest sepals of average length of 6.5cm</a:t>
             </a:r>
           </a:p>
           <a:p>
@@ -5535,7 +5693,7 @@
             </a:pPr>
             <a:r>
               <a:rPr lang="en-US" sz="1800" dirty="0"/>
-              <a:t>Iris-Versicolor are shorter in all aspects than Iris-</a:t>
+              <a:t>Iris-Versicolor are shorter in all aspects to the Iris-</a:t>
             </a:r>
             <a:r>
               <a:rPr lang="en-US" sz="1800" dirty="0" err="1"/>
@@ -5543,7 +5701,7 @@
             </a:r>
             <a:r>
               <a:rPr lang="en-US" sz="1800" dirty="0"/>
-              <a:t> having an average petal dimension of 4.2cm x 1.30cm</a:t>
+              <a:t>  having an average petal dimension of 4.2cm x 1.30cm</a:t>
             </a:r>
           </a:p>
           <a:p>

</xml_diff>

<commit_message>
Changing font and colour
</commit_message>
<xml_diff>
--- a/IrisPresentation.pptx
+++ b/IrisPresentation.pptx
@@ -262,7 +262,7 @@
           <a:p>
             <a:fld id="{9D122DCD-549A-4F25-BB97-437A8A1755C2}" type="datetimeFigureOut">
               <a:rPr lang="en-US" smtClean="0"/>
-              <a:t>3/3/2018</a:t>
+              <a:t>3/5/2018</a:t>
             </a:fld>
             <a:endParaRPr lang="en-US"/>
           </a:p>
@@ -460,7 +460,7 @@
           <a:p>
             <a:fld id="{9D122DCD-549A-4F25-BB97-437A8A1755C2}" type="datetimeFigureOut">
               <a:rPr lang="en-US" smtClean="0"/>
-              <a:t>3/3/2018</a:t>
+              <a:t>3/5/2018</a:t>
             </a:fld>
             <a:endParaRPr lang="en-US"/>
           </a:p>
@@ -668,7 +668,7 @@
           <a:p>
             <a:fld id="{9D122DCD-549A-4F25-BB97-437A8A1755C2}" type="datetimeFigureOut">
               <a:rPr lang="en-US" smtClean="0"/>
-              <a:t>3/3/2018</a:t>
+              <a:t>3/5/2018</a:t>
             </a:fld>
             <a:endParaRPr lang="en-US"/>
           </a:p>
@@ -866,7 +866,7 @@
           <a:p>
             <a:fld id="{9D122DCD-549A-4F25-BB97-437A8A1755C2}" type="datetimeFigureOut">
               <a:rPr lang="en-US" smtClean="0"/>
-              <a:t>3/3/2018</a:t>
+              <a:t>3/5/2018</a:t>
             </a:fld>
             <a:endParaRPr lang="en-US"/>
           </a:p>
@@ -1141,7 +1141,7 @@
           <a:p>
             <a:fld id="{9D122DCD-549A-4F25-BB97-437A8A1755C2}" type="datetimeFigureOut">
               <a:rPr lang="en-US" smtClean="0"/>
-              <a:t>3/3/2018</a:t>
+              <a:t>3/5/2018</a:t>
             </a:fld>
             <a:endParaRPr lang="en-US"/>
           </a:p>
@@ -1406,7 +1406,7 @@
           <a:p>
             <a:fld id="{9D122DCD-549A-4F25-BB97-437A8A1755C2}" type="datetimeFigureOut">
               <a:rPr lang="en-US" smtClean="0"/>
-              <a:t>3/3/2018</a:t>
+              <a:t>3/5/2018</a:t>
             </a:fld>
             <a:endParaRPr lang="en-US"/>
           </a:p>
@@ -1818,7 +1818,7 @@
           <a:p>
             <a:fld id="{9D122DCD-549A-4F25-BB97-437A8A1755C2}" type="datetimeFigureOut">
               <a:rPr lang="en-US" smtClean="0"/>
-              <a:t>3/3/2018</a:t>
+              <a:t>3/5/2018</a:t>
             </a:fld>
             <a:endParaRPr lang="en-US"/>
           </a:p>
@@ -1959,7 +1959,7 @@
           <a:p>
             <a:fld id="{9D122DCD-549A-4F25-BB97-437A8A1755C2}" type="datetimeFigureOut">
               <a:rPr lang="en-US" smtClean="0"/>
-              <a:t>3/3/2018</a:t>
+              <a:t>3/5/2018</a:t>
             </a:fld>
             <a:endParaRPr lang="en-US"/>
           </a:p>
@@ -2072,7 +2072,7 @@
           <a:p>
             <a:fld id="{9D122DCD-549A-4F25-BB97-437A8A1755C2}" type="datetimeFigureOut">
               <a:rPr lang="en-US" smtClean="0"/>
-              <a:t>3/3/2018</a:t>
+              <a:t>3/5/2018</a:t>
             </a:fld>
             <a:endParaRPr lang="en-US"/>
           </a:p>
@@ -2383,7 +2383,7 @@
           <a:p>
             <a:fld id="{9D122DCD-549A-4F25-BB97-437A8A1755C2}" type="datetimeFigureOut">
               <a:rPr lang="en-US" smtClean="0"/>
-              <a:t>3/3/2018</a:t>
+              <a:t>3/5/2018</a:t>
             </a:fld>
             <a:endParaRPr lang="en-US"/>
           </a:p>
@@ -2671,7 +2671,7 @@
           <a:p>
             <a:fld id="{9D122DCD-549A-4F25-BB97-437A8A1755C2}" type="datetimeFigureOut">
               <a:rPr lang="en-US" smtClean="0"/>
-              <a:t>3/3/2018</a:t>
+              <a:t>3/5/2018</a:t>
             </a:fld>
             <a:endParaRPr lang="en-US"/>
           </a:p>
@@ -2912,7 +2912,7 @@
           <a:p>
             <a:fld id="{9D122DCD-549A-4F25-BB97-437A8A1755C2}" type="datetimeFigureOut">
               <a:rPr lang="en-US" smtClean="0"/>
-              <a:t>3/3/2018</a:t>
+              <a:t>3/5/2018</a:t>
             </a:fld>
             <a:endParaRPr lang="en-US"/>
           </a:p>
@@ -3532,10 +3532,7 @@
     <p:bg>
       <p:bgPr>
         <a:solidFill>
-          <a:schemeClr val="bg1">
-            <a:tint val="95000"/>
-            <a:satMod val="170000"/>
-          </a:schemeClr>
+          <a:schemeClr val="tx1"/>
         </a:solidFill>
         <a:effectLst/>
       </p:bgPr>
@@ -3554,6 +3551,41 @@
           <a:chExt cx="0" cy="0"/>
         </a:xfrm>
       </p:grpSpPr>
+      <p:pic>
+        <p:nvPicPr>
+          <p:cNvPr id="7" name="Picture 6">
+            <a:extLst>
+              <a:ext uri="{FF2B5EF4-FFF2-40B4-BE49-F238E27FC236}">
+                <a16:creationId xmlns:a16="http://schemas.microsoft.com/office/drawing/2014/main" id="{D70DC6A5-AFEE-4D4E-80DA-06FC327EF9B7}"/>
+              </a:ext>
+            </a:extLst>
+          </p:cNvPr>
+          <p:cNvPicPr>
+            <a:picLocks noChangeAspect="1"/>
+          </p:cNvPicPr>
+          <p:nvPr/>
+        </p:nvPicPr>
+        <p:blipFill rotWithShape="1">
+          <a:blip r:embed="rId2">
+            <a:extLst>
+              <a:ext uri="{28A0092B-C50C-407E-A947-70E740481C1C}">
+                <a14:useLocalDpi xmlns:a14="http://schemas.microsoft.com/office/drawing/2010/main" val="0"/>
+              </a:ext>
+            </a:extLst>
+          </a:blip>
+          <a:srcRect r="45022"/>
+          <a:stretch/>
+        </p:blipFill>
+        <p:spPr>
+          <a:xfrm>
+            <a:off x="-1" y="0"/>
+            <a:ext cx="12192001" cy="6858000"/>
+          </a:xfrm>
+          <a:prstGeom prst="rect">
+            <a:avLst/>
+          </a:prstGeom>
+        </p:spPr>
+      </p:pic>
       <p:sp>
         <p:nvSpPr>
           <p:cNvPr id="24" name="Rectangle 19">
@@ -3714,7 +3746,7 @@
           <p:nvPr/>
         </p:nvPicPr>
         <p:blipFill rotWithShape="1">
-          <a:blip r:embed="rId2"/>
+          <a:blip r:embed="rId3"/>
           <a:srcRect l="27293" t="34504" r="51098" b="49890"/>
           <a:stretch/>
         </p:blipFill>
@@ -3758,9 +3790,18 @@
           <a:p>
             <a:r>
               <a:rPr lang="en-US" dirty="0">
+                <a:solidFill>
+                  <a:schemeClr val="bg1"/>
+                </a:solidFill>
                 <a:latin typeface="Bahnschrift" panose="020B0502040204020203" pitchFamily="34" charset="0"/>
               </a:rPr>
-              <a:t>  Iris                                              Data Exploration</a:t>
+              <a:t>  </a:t>
+            </a:r>
+            <a:r>
+              <a:rPr lang="en-US" dirty="0">
+                <a:latin typeface="Bahnschrift" panose="020B0502040204020203" pitchFamily="34" charset="0"/>
+              </a:rPr>
+              <a:t>Iris                                              Data Exploration</a:t>
             </a:r>
           </a:p>
         </p:txBody>
@@ -3797,7 +3838,9 @@
               <a:buNone/>
             </a:pPr>
             <a:r>
-              <a:rPr lang="en-US" sz="1500" dirty="0"/>
+              <a:rPr lang="en-US" sz="1500" dirty="0">
+                <a:latin typeface="Bahnschrift" panose="020B0502040204020203" pitchFamily="34" charset="0"/>
+              </a:rPr>
               <a:t>Dataset downloaded from University of California, Irvine:</a:t>
             </a:r>
           </a:p>
@@ -3806,20 +3849,40 @@
               <a:buNone/>
             </a:pPr>
             <a:r>
-              <a:rPr lang="en-US" sz="1500" dirty="0"/>
+              <a:rPr lang="en-US" sz="1500" dirty="0">
+                <a:solidFill>
+                  <a:schemeClr val="accent4">
+                    <a:lumMod val="40000"/>
+                    <a:lumOff val="60000"/>
+                  </a:schemeClr>
+                </a:solidFill>
+                <a:latin typeface="Bahnschrift" panose="020B0502040204020203" pitchFamily="34" charset="0"/>
+              </a:rPr>
               <a:t>https://archive.ics.uci.edu/ml/machine-learning-databases/iris/</a:t>
             </a:r>
             <a:br>
-              <a:rPr lang="en-US" sz="1500" dirty="0"/>
+              <a:rPr lang="en-US" sz="1500" dirty="0">
+                <a:solidFill>
+                  <a:schemeClr val="bg1"/>
+                </a:solidFill>
+                <a:latin typeface="Bahnschrift" panose="020B0502040204020203" pitchFamily="34" charset="0"/>
+              </a:rPr>
             </a:br>
-            <a:endParaRPr lang="en-US" sz="1500" dirty="0"/>
+            <a:endParaRPr lang="en-US" sz="1500" dirty="0">
+              <a:solidFill>
+                <a:schemeClr val="bg1"/>
+              </a:solidFill>
+              <a:latin typeface="Bahnschrift" panose="020B0502040204020203" pitchFamily="34" charset="0"/>
+            </a:endParaRPr>
           </a:p>
           <a:p>
             <a:pPr marL="0" indent="0">
               <a:buNone/>
             </a:pPr>
             <a:r>
-              <a:rPr lang="en-US" sz="1500" dirty="0"/>
+              <a:rPr lang="en-US" sz="1500" dirty="0">
+                <a:latin typeface="Bahnschrift" panose="020B0502040204020203" pitchFamily="34" charset="0"/>
+              </a:rPr>
               <a:t>The Dataset contains:</a:t>
             </a:r>
           </a:p>
@@ -3829,7 +3892,15 @@
               <a:buChar char="§"/>
             </a:pPr>
             <a:r>
-              <a:rPr lang="en-US" sz="1500" dirty="0"/>
+              <a:rPr lang="en-US" sz="1500" dirty="0">
+                <a:solidFill>
+                  <a:schemeClr val="accent6">
+                    <a:lumMod val="40000"/>
+                    <a:lumOff val="60000"/>
+                  </a:schemeClr>
+                </a:solidFill>
+                <a:latin typeface="Bahnschrift" panose="020B0502040204020203" pitchFamily="34" charset="0"/>
+              </a:rPr>
               <a:t>150 rows of data</a:t>
             </a:r>
           </a:p>
@@ -3839,7 +3910,15 @@
               <a:buChar char="§"/>
             </a:pPr>
             <a:r>
-              <a:rPr lang="en-US" sz="1500" dirty="0"/>
+              <a:rPr lang="en-US" sz="1500" dirty="0">
+                <a:solidFill>
+                  <a:schemeClr val="accent6">
+                    <a:lumMod val="40000"/>
+                    <a:lumOff val="60000"/>
+                  </a:schemeClr>
+                </a:solidFill>
+                <a:latin typeface="Bahnschrift" panose="020B0502040204020203" pitchFamily="34" charset="0"/>
+              </a:rPr>
               <a:t>5 Columns (Sepal length, Sepal width, Petal Length, Petal Width, Class)  </a:t>
             </a:r>
           </a:p>
@@ -3849,15 +3928,39 @@
               <a:buChar char="§"/>
             </a:pPr>
             <a:r>
-              <a:rPr lang="en-US" sz="1500" dirty="0"/>
+              <a:rPr lang="en-US" sz="1500" dirty="0">
+                <a:solidFill>
+                  <a:schemeClr val="accent6">
+                    <a:lumMod val="40000"/>
+                    <a:lumOff val="60000"/>
+                  </a:schemeClr>
+                </a:solidFill>
+                <a:latin typeface="Bahnschrift" panose="020B0502040204020203" pitchFamily="34" charset="0"/>
+              </a:rPr>
               <a:t>3 Species of Iris (</a:t>
             </a:r>
             <a:r>
-              <a:rPr lang="en-US" sz="1500" dirty="0" err="1"/>
+              <a:rPr lang="en-US" sz="1500" dirty="0" err="1">
+                <a:solidFill>
+                  <a:schemeClr val="accent6">
+                    <a:lumMod val="40000"/>
+                    <a:lumOff val="60000"/>
+                  </a:schemeClr>
+                </a:solidFill>
+                <a:latin typeface="Bahnschrift" panose="020B0502040204020203" pitchFamily="34" charset="0"/>
+              </a:rPr>
               <a:t>Setosa</a:t>
             </a:r>
             <a:r>
-              <a:rPr lang="en-US" sz="1500" dirty="0"/>
+              <a:rPr lang="en-US" sz="1500" dirty="0">
+                <a:solidFill>
+                  <a:schemeClr val="accent6">
+                    <a:lumMod val="40000"/>
+                    <a:lumOff val="60000"/>
+                  </a:schemeClr>
+                </a:solidFill>
+                <a:latin typeface="Bahnschrift" panose="020B0502040204020203" pitchFamily="34" charset="0"/>
+              </a:rPr>
               <a:t>, Versicolor, Virginica) fifty (50) instances each</a:t>
             </a:r>
           </a:p>
@@ -3865,14 +3968,21 @@
             <a:pPr marL="0" indent="0">
               <a:buNone/>
             </a:pPr>
-            <a:endParaRPr lang="en-US" sz="1500" dirty="0"/>
+            <a:endParaRPr lang="en-US" sz="1500" dirty="0">
+              <a:solidFill>
+                <a:schemeClr val="bg1"/>
+              </a:solidFill>
+              <a:latin typeface="Bahnschrift" panose="020B0502040204020203" pitchFamily="34" charset="0"/>
+            </a:endParaRPr>
           </a:p>
           <a:p>
             <a:pPr marL="0" indent="0">
               <a:buNone/>
             </a:pPr>
             <a:r>
-              <a:rPr lang="en-US" sz="1500" dirty="0"/>
+              <a:rPr lang="en-US" sz="1500" dirty="0">
+                <a:latin typeface="Bahnschrift" panose="020B0502040204020203" pitchFamily="34" charset="0"/>
+              </a:rPr>
               <a:t>Immediate findings:</a:t>
             </a:r>
           </a:p>
@@ -3882,7 +3992,15 @@
               <a:buChar char="§"/>
             </a:pPr>
             <a:r>
-              <a:rPr lang="en-US" sz="1500" dirty="0"/>
+              <a:rPr lang="en-US" sz="1500" dirty="0">
+                <a:solidFill>
+                  <a:schemeClr val="accent5">
+                    <a:lumMod val="40000"/>
+                    <a:lumOff val="60000"/>
+                  </a:schemeClr>
+                </a:solidFill>
+                <a:latin typeface="Bahnschrift" panose="020B0502040204020203" pitchFamily="34" charset="0"/>
+              </a:rPr>
               <a:t>Sepal dimensions are symmetrical</a:t>
             </a:r>
           </a:p>
@@ -3892,7 +4010,15 @@
               <a:buChar char="§"/>
             </a:pPr>
             <a:r>
-              <a:rPr lang="en-US" sz="1500" dirty="0"/>
+              <a:rPr lang="en-US" sz="1500" dirty="0">
+                <a:solidFill>
+                  <a:schemeClr val="accent5">
+                    <a:lumMod val="40000"/>
+                    <a:lumOff val="60000"/>
+                  </a:schemeClr>
+                </a:solidFill>
+                <a:latin typeface="Bahnschrift" panose="020B0502040204020203" pitchFamily="34" charset="0"/>
+              </a:rPr>
               <a:t>Standard deviation is small thus variance is small</a:t>
             </a:r>
           </a:p>
@@ -3902,7 +4028,15 @@
               <a:buChar char="§"/>
             </a:pPr>
             <a:r>
-              <a:rPr lang="en-US" sz="1500" dirty="0"/>
+              <a:rPr lang="en-US" sz="1500" dirty="0">
+                <a:solidFill>
+                  <a:schemeClr val="accent5">
+                    <a:lumMod val="40000"/>
+                    <a:lumOff val="60000"/>
+                  </a:schemeClr>
+                </a:solidFill>
+                <a:latin typeface="Bahnschrift" panose="020B0502040204020203" pitchFamily="34" charset="0"/>
+              </a:rPr>
               <a:t>Petal length has largest range and greatest variance in values</a:t>
             </a:r>
           </a:p>
@@ -3910,7 +4044,11 @@
             <a:pPr marL="0" indent="0">
               <a:buNone/>
             </a:pPr>
-            <a:endParaRPr lang="en-US" sz="1500" dirty="0"/>
+            <a:endParaRPr lang="en-US" sz="1500" dirty="0">
+              <a:solidFill>
+                <a:schemeClr val="bg1"/>
+              </a:solidFill>
+            </a:endParaRPr>
           </a:p>
           <a:p>
             <a:pPr>
@@ -3936,7 +4074,7 @@
           <p:nvPr/>
         </p:nvPicPr>
         <p:blipFill rotWithShape="1">
-          <a:blip r:embed="rId3"/>
+          <a:blip r:embed="rId4"/>
           <a:srcRect l="28817" t="35862" r="49533" b="39639"/>
           <a:stretch/>
         </p:blipFill>
@@ -3965,7 +4103,7 @@
           <p:nvPr/>
         </p:nvPicPr>
         <p:blipFill rotWithShape="1">
-          <a:blip r:embed="rId3"/>
+          <a:blip r:embed="rId4"/>
           <a:srcRect l="28670" t="78226" r="50677" b="15338"/>
           <a:stretch/>
         </p:blipFill>
@@ -3998,10 +4136,7 @@
     <p:bg>
       <p:bgPr>
         <a:solidFill>
-          <a:schemeClr val="bg1">
-            <a:tint val="95000"/>
-            <a:satMod val="170000"/>
-          </a:schemeClr>
+          <a:srgbClr val="FFFFFF"/>
         </a:solidFill>
         <a:effectLst/>
       </p:bgPr>
@@ -4109,6 +4244,41 @@
           </a:p>
         </p:txBody>
       </p:sp>
+      <p:pic>
+        <p:nvPicPr>
+          <p:cNvPr id="5" name="Picture 4">
+            <a:extLst>
+              <a:ext uri="{FF2B5EF4-FFF2-40B4-BE49-F238E27FC236}">
+                <a16:creationId xmlns:a16="http://schemas.microsoft.com/office/drawing/2014/main" id="{DC4259A7-8A2E-49C6-9723-75EEC3C9A2DD}"/>
+              </a:ext>
+            </a:extLst>
+          </p:cNvPr>
+          <p:cNvPicPr>
+            <a:picLocks noChangeAspect="1"/>
+          </p:cNvPicPr>
+          <p:nvPr/>
+        </p:nvPicPr>
+        <p:blipFill rotWithShape="1">
+          <a:blip r:embed="rId2">
+            <a:extLst>
+              <a:ext uri="{28A0092B-C50C-407E-A947-70E740481C1C}">
+                <a14:useLocalDpi xmlns:a14="http://schemas.microsoft.com/office/drawing/2010/main" val="0"/>
+              </a:ext>
+            </a:extLst>
+          </a:blip>
+          <a:srcRect r="45414"/>
+          <a:stretch/>
+        </p:blipFill>
+        <p:spPr>
+          <a:xfrm>
+            <a:off x="0" y="-19346"/>
+            <a:ext cx="12192000" cy="6858000"/>
+          </a:xfrm>
+          <a:prstGeom prst="rect">
+            <a:avLst/>
+          </a:prstGeom>
+        </p:spPr>
+      </p:pic>
       <p:sp>
         <p:nvSpPr>
           <p:cNvPr id="36" name="Rectangle 35">
@@ -4522,7 +4692,7 @@
           <p:nvPr/>
         </p:nvPicPr>
         <p:blipFill>
-          <a:blip r:embed="rId2">
+          <a:blip r:embed="rId3">
             <a:extLst>
               <a:ext uri="{28A0092B-C50C-407E-A947-70E740481C1C}">
                 <a14:useLocalDpi xmlns:a14="http://schemas.microsoft.com/office/drawing/2010/main" val="0"/>
@@ -4535,8 +4705,8 @@
         </p:blipFill>
         <p:spPr>
           <a:xfrm>
-            <a:off x="4125225" y="1011009"/>
-            <a:ext cx="2783652" cy="1667624"/>
+            <a:off x="4152946" y="1051902"/>
+            <a:ext cx="2765758" cy="1656904"/>
           </a:xfrm>
           <a:prstGeom prst="rect">
             <a:avLst/>
@@ -4558,7 +4728,7 @@
           <p:nvPr/>
         </p:nvPicPr>
         <p:blipFill>
-          <a:blip r:embed="rId3">
+          <a:blip r:embed="rId4">
             <a:extLst>
               <a:ext uri="{28A0092B-C50C-407E-A947-70E740481C1C}">
                 <a14:useLocalDpi xmlns:a14="http://schemas.microsoft.com/office/drawing/2010/main" val="0"/>
@@ -4571,7 +4741,7 @@
         </p:blipFill>
         <p:spPr>
           <a:xfrm>
-            <a:off x="4165677" y="3627930"/>
+            <a:off x="4152946" y="3520864"/>
             <a:ext cx="2702748" cy="1827707"/>
           </a:xfrm>
           <a:prstGeom prst="rect">
@@ -4594,7 +4764,7 @@
           <p:nvPr/>
         </p:nvPicPr>
         <p:blipFill>
-          <a:blip r:embed="rId4">
+          <a:blip r:embed="rId5">
             <a:extLst>
               <a:ext uri="{28A0092B-C50C-407E-A947-70E740481C1C}">
                 <a14:useLocalDpi xmlns:a14="http://schemas.microsoft.com/office/drawing/2010/main" val="0"/>
@@ -4658,6 +4828,12 @@
             </a:pPr>
             <a:r>
               <a:rPr lang="en-US" sz="1800" dirty="0">
+                <a:solidFill>
+                  <a:schemeClr val="accent2">
+                    <a:lumMod val="40000"/>
+                    <a:lumOff val="60000"/>
+                  </a:schemeClr>
+                </a:solidFill>
                 <a:latin typeface="Bahnschrift" panose="020B0502040204020203" pitchFamily="34" charset="0"/>
               </a:rPr>
               <a:t>Boxplot of Iris attributes</a:t>
@@ -4680,7 +4856,7 @@
           <p:nvPr/>
         </p:nvPicPr>
         <p:blipFill rotWithShape="1">
-          <a:blip r:embed="rId5">
+          <a:blip r:embed="rId6">
             <a:extLst>
               <a:ext uri="{28A0092B-C50C-407E-A947-70E740481C1C}">
                 <a14:useLocalDpi xmlns:a14="http://schemas.microsoft.com/office/drawing/2010/main" val="0"/>
@@ -4737,8 +4913,10 @@
               <a:rPr lang="en-US" sz="3400" dirty="0"/>
             </a:br>
             <a:r>
-              <a:rPr lang="en-US" sz="3400" b="1" dirty="0"/>
-              <a:t>Visualization of Iris Data</a:t>
+              <a:rPr lang="en-US" sz="3400" b="1" dirty="0">
+                <a:latin typeface="Bahnschrift" panose="020B0502040204020203" pitchFamily="34" charset="0"/>
+              </a:rPr>
+              <a:t>Iris Data Exploration Cont’d</a:t>
             </a:r>
           </a:p>
         </p:txBody>
@@ -4758,7 +4936,7 @@
           <p:nvPr/>
         </p:nvPicPr>
         <p:blipFill>
-          <a:blip r:embed="rId6">
+          <a:blip r:embed="rId7">
             <a:extLst>
               <a:ext uri="{28A0092B-C50C-407E-A947-70E740481C1C}">
                 <a14:useLocalDpi xmlns:a14="http://schemas.microsoft.com/office/drawing/2010/main" val="0"/>
@@ -4771,7 +4949,7 @@
         </p:blipFill>
         <p:spPr>
           <a:xfrm>
-            <a:off x="923110" y="4266948"/>
+            <a:off x="912791" y="4266948"/>
             <a:ext cx="2795395" cy="1941038"/>
           </a:xfrm>
           <a:prstGeom prst="rect">
@@ -4810,7 +4988,7 @@
             <a:r>
               <a:rPr lang="en-US" sz="1600" dirty="0">
                 <a:solidFill>
-                  <a:schemeClr val="bg1"/>
+                  <a:srgbClr val="13576F"/>
                 </a:solidFill>
                 <a:latin typeface="Bahnschrift" panose="020B0502040204020203" pitchFamily="34" charset="0"/>
               </a:rPr>
@@ -4850,7 +5028,7 @@
             <a:r>
               <a:rPr lang="en-US" sz="1600" dirty="0">
                 <a:solidFill>
-                  <a:schemeClr val="bg1"/>
+                  <a:srgbClr val="13576F"/>
                 </a:solidFill>
                 <a:latin typeface="Bahnschrift" panose="020B0502040204020203" pitchFamily="34" charset="0"/>
               </a:rPr>
@@ -4890,7 +5068,7 @@
             <a:r>
               <a:rPr lang="en-US" sz="1600" dirty="0">
                 <a:solidFill>
-                  <a:schemeClr val="bg1"/>
+                  <a:srgbClr val="E1812C"/>
                 </a:solidFill>
                 <a:latin typeface="Bahnschrift" panose="020B0502040204020203" pitchFamily="34" charset="0"/>
               </a:rPr>
@@ -4930,7 +5108,7 @@
             <a:r>
               <a:rPr lang="en-US" sz="1600" dirty="0">
                 <a:solidFill>
-                  <a:schemeClr val="bg1"/>
+                  <a:srgbClr val="E1812C"/>
                 </a:solidFill>
                 <a:latin typeface="Bahnschrift" panose="020B0502040204020203" pitchFamily="34" charset="0"/>
               </a:rPr>
@@ -4993,13 +5171,6 @@
         </p:nvPicPr>
         <p:blipFill rotWithShape="1">
           <a:blip r:embed="rId2">
-            <a:duotone>
-              <a:prstClr val="black"/>
-              <a:schemeClr val="tx2">
-                <a:tint val="45000"/>
-                <a:satMod val="400000"/>
-              </a:schemeClr>
-            </a:duotone>
             <a:alphaModFix amt="35000"/>
             <a:extLst>
               <a:ext uri="{28A0092B-C50C-407E-A947-70E740481C1C}">
@@ -5012,22 +5183,14 @@
         </p:blipFill>
         <p:spPr bwMode="auto">
           <a:xfrm>
-            <a:off x="-7" y="-8"/>
+            <a:off x="-7" y="-4746"/>
             <a:ext cx="12192000" cy="6855958"/>
           </a:xfrm>
           <a:prstGeom prst="rect">
             <a:avLst/>
           </a:prstGeom>
           <a:noFill/>
-          <a:extLst>
-            <a:ext uri="{909E8E84-426E-40DD-AFC4-6F175D3DCCD1}">
-              <a14:hiddenFill xmlns:a14="http://schemas.microsoft.com/office/drawing/2010/main">
-                <a:solidFill>
-                  <a:srgbClr val="FFFFFF"/>
-                </a:solidFill>
-              </a14:hiddenFill>
-            </a:ext>
-          </a:extLst>
+          <a:extLst/>
         </p:spPr>
       </p:pic>
       <p:sp>

</xml_diff>